<commit_message>
Updated code review slides
</commit_message>
<xml_diff>
--- a/presentations/code-review.pptx
+++ b/presentations/code-review.pptx
@@ -262,7 +262,7 @@
           <a:p>
             <a:fld id="{269B52A7-EA3E-4837-986C-E93933C812D2}" type="datetimeFigureOut">
               <a:rPr lang="en-US" smtClean="0"/>
-              <a:t>8/25/2015</a:t>
+              <a:t>8/28/2015</a:t>
             </a:fld>
             <a:endParaRPr lang="en-US"/>
           </a:p>
@@ -432,7 +432,7 @@
           <a:p>
             <a:fld id="{269B52A7-EA3E-4837-986C-E93933C812D2}" type="datetimeFigureOut">
               <a:rPr lang="en-US" smtClean="0"/>
-              <a:t>8/25/2015</a:t>
+              <a:t>8/28/2015</a:t>
             </a:fld>
             <a:endParaRPr lang="en-US"/>
           </a:p>
@@ -612,7 +612,7 @@
           <a:p>
             <a:fld id="{269B52A7-EA3E-4837-986C-E93933C812D2}" type="datetimeFigureOut">
               <a:rPr lang="en-US" smtClean="0"/>
-              <a:t>8/25/2015</a:t>
+              <a:t>8/28/2015</a:t>
             </a:fld>
             <a:endParaRPr lang="en-US"/>
           </a:p>
@@ -782,7 +782,7 @@
           <a:p>
             <a:fld id="{269B52A7-EA3E-4837-986C-E93933C812D2}" type="datetimeFigureOut">
               <a:rPr lang="en-US" smtClean="0"/>
-              <a:t>8/25/2015</a:t>
+              <a:t>8/28/2015</a:t>
             </a:fld>
             <a:endParaRPr lang="en-US"/>
           </a:p>
@@ -1028,7 +1028,7 @@
           <a:p>
             <a:fld id="{269B52A7-EA3E-4837-986C-E93933C812D2}" type="datetimeFigureOut">
               <a:rPr lang="en-US" smtClean="0"/>
-              <a:t>8/25/2015</a:t>
+              <a:t>8/28/2015</a:t>
             </a:fld>
             <a:endParaRPr lang="en-US"/>
           </a:p>
@@ -1260,7 +1260,7 @@
           <a:p>
             <a:fld id="{269B52A7-EA3E-4837-986C-E93933C812D2}" type="datetimeFigureOut">
               <a:rPr lang="en-US" smtClean="0"/>
-              <a:t>8/25/2015</a:t>
+              <a:t>8/28/2015</a:t>
             </a:fld>
             <a:endParaRPr lang="en-US"/>
           </a:p>
@@ -1627,7 +1627,7 @@
           <a:p>
             <a:fld id="{269B52A7-EA3E-4837-986C-E93933C812D2}" type="datetimeFigureOut">
               <a:rPr lang="en-US" smtClean="0"/>
-              <a:t>8/25/2015</a:t>
+              <a:t>8/28/2015</a:t>
             </a:fld>
             <a:endParaRPr lang="en-US"/>
           </a:p>
@@ -1745,7 +1745,7 @@
           <a:p>
             <a:fld id="{269B52A7-EA3E-4837-986C-E93933C812D2}" type="datetimeFigureOut">
               <a:rPr lang="en-US" smtClean="0"/>
-              <a:t>8/25/2015</a:t>
+              <a:t>8/28/2015</a:t>
             </a:fld>
             <a:endParaRPr lang="en-US"/>
           </a:p>
@@ -1840,7 +1840,7 @@
           <a:p>
             <a:fld id="{269B52A7-EA3E-4837-986C-E93933C812D2}" type="datetimeFigureOut">
               <a:rPr lang="en-US" smtClean="0"/>
-              <a:t>8/25/2015</a:t>
+              <a:t>8/28/2015</a:t>
             </a:fld>
             <a:endParaRPr lang="en-US"/>
           </a:p>
@@ -2117,7 +2117,7 @@
           <a:p>
             <a:fld id="{269B52A7-EA3E-4837-986C-E93933C812D2}" type="datetimeFigureOut">
               <a:rPr lang="en-US" smtClean="0"/>
-              <a:t>8/25/2015</a:t>
+              <a:t>8/28/2015</a:t>
             </a:fld>
             <a:endParaRPr lang="en-US"/>
           </a:p>
@@ -2370,7 +2370,7 @@
           <a:p>
             <a:fld id="{269B52A7-EA3E-4837-986C-E93933C812D2}" type="datetimeFigureOut">
               <a:rPr lang="en-US" smtClean="0"/>
-              <a:t>8/25/2015</a:t>
+              <a:t>8/28/2015</a:t>
             </a:fld>
             <a:endParaRPr lang="en-US"/>
           </a:p>
@@ -2583,7 +2583,7 @@
           <a:p>
             <a:fld id="{269B52A7-EA3E-4837-986C-E93933C812D2}" type="datetimeFigureOut">
               <a:rPr lang="en-US" smtClean="0"/>
-              <a:t>8/25/2015</a:t>
+              <a:t>8/28/2015</a:t>
             </a:fld>
             <a:endParaRPr lang="en-US"/>
           </a:p>
@@ -4701,23 +4701,7 @@
           <a:p>
             <a:r>
               <a:rPr lang="en-US" dirty="0" smtClean="0"/>
-              <a:t>Loads tweets in GCD format from </a:t>
-            </a:r>
-            <a:r>
-              <a:rPr lang="en-US" dirty="0" smtClean="0"/>
-              <a:t>HDFS </a:t>
-            </a:r>
-            <a:r>
-              <a:rPr lang="en-US" dirty="0" smtClean="0"/>
-              <a:t>and </a:t>
-            </a:r>
-            <a:r>
-              <a:rPr lang="en-US" dirty="0" smtClean="0"/>
-              <a:t>writes them out to HDFS in tab-separated format with the columns specified in the source </a:t>
-            </a:r>
-            <a:r>
-              <a:rPr lang="en-US" dirty="0" smtClean="0"/>
-              <a:t>file</a:t>
+              <a:t>Loads tweets in GCD format from HDFS and writes them out to HDFS in tab-separated format with the columns specified in the source file</a:t>
             </a:r>
           </a:p>
           <a:p>
@@ -4725,44 +4709,35 @@
               <a:rPr lang="en-US" dirty="0" smtClean="0"/>
               <a:t>Eliminates non-English and tweets duplicated due to retweet</a:t>
             </a:r>
+          </a:p>
+          <a:p>
+            <a:r>
+              <a:rPr lang="en-US" dirty="0" smtClean="0"/>
+              <a:t>Writes the tweets out to some number of user splits (all tweets from a certain user will be in a single split)</a:t>
+            </a:r>
+          </a:p>
+          <a:p>
+            <a:pPr lvl="1"/>
+            <a:r>
+              <a:rPr lang="en-US" dirty="0" smtClean="0"/>
+              <a:t>Each split has its own directory in HDFS</a:t>
+            </a:r>
+          </a:p>
+          <a:p>
+            <a:r>
+              <a:rPr lang="en-US" dirty="0" smtClean="0"/>
+              <a:t>We used 24 splits and put one split on each </a:t>
+            </a:r>
+            <a:r>
+              <a:rPr lang="en-US" dirty="0" err="1" smtClean="0"/>
+              <a:t>datanode</a:t>
+            </a:r>
             <a:endParaRPr lang="en-US" dirty="0" smtClean="0"/>
           </a:p>
           <a:p>
             <a:r>
               <a:rPr lang="en-US" dirty="0" smtClean="0"/>
-              <a:t>Writes the tweets out to some number of user splits (all tweets from a certain user will be in a single split)</a:t>
-            </a:r>
-          </a:p>
-          <a:p>
-            <a:pPr lvl="1"/>
-            <a:r>
-              <a:rPr lang="en-US" dirty="0" smtClean="0"/>
-              <a:t>Each split has its own directory in HDFS</a:t>
-            </a:r>
-          </a:p>
-          <a:p>
-            <a:r>
-              <a:rPr lang="en-US" dirty="0" smtClean="0"/>
-              <a:t>We used 24 splits and put one split on each </a:t>
-            </a:r>
-            <a:r>
-              <a:rPr lang="en-US" dirty="0" err="1" smtClean="0"/>
-              <a:t>datanode</a:t>
-            </a:r>
-            <a:endParaRPr lang="en-US" dirty="0" smtClean="0"/>
-          </a:p>
-          <a:p>
-            <a:r>
-              <a:rPr lang="en-US" dirty="0" smtClean="0"/>
-              <a:t> </a:t>
-            </a:r>
-            <a:r>
-              <a:rPr lang="en-US" dirty="0" smtClean="0"/>
-              <a:t>fetcher.py (see Scripts section) </a:t>
-            </a:r>
-            <a:r>
-              <a:rPr lang="en-US" dirty="0" smtClean="0"/>
-              <a:t>can fetch the splits to the  </a:t>
+              <a:t> fetcher.py (see Scripts section) can fetch the splits to the  </a:t>
             </a:r>
             <a:r>
               <a:rPr lang="en-US" dirty="0" err="1" smtClean="0"/>
@@ -4842,15 +4817,7 @@
           <a:p>
             <a:r>
               <a:rPr lang="en-US" dirty="0" smtClean="0"/>
-              <a:t>Loads tweets </a:t>
-            </a:r>
-            <a:r>
-              <a:rPr lang="en-US" dirty="0" smtClean="0"/>
-              <a:t>in this format </a:t>
-            </a:r>
-            <a:r>
-              <a:rPr lang="en-US" dirty="0" smtClean="0"/>
-              <a:t>(15 columns, already tab-separated) from HDFS and writes them out to HDFS in tab-separated format, preserving all of the columns in the input</a:t>
+              <a:t>Loads tweets in this format (15 columns, already tab-separated) from HDFS and writes them out to HDFS in tab-separated format, preserving all of the columns in the input</a:t>
             </a:r>
           </a:p>
           <a:p>
@@ -5017,7 +4984,7 @@
         <p:spPr/>
         <p:txBody>
           <a:bodyPr>
-            <a:normAutofit lnSpcReduction="10000"/>
+            <a:normAutofit fontScale="92500" lnSpcReduction="20000"/>
           </a:bodyPr>
           <a:lstStyle/>
           <a:p>
@@ -5057,6 +5024,38 @@
               <a:rPr lang="en-US" dirty="0" smtClean="0"/>
               <a:t>)</a:t>
             </a:r>
+          </a:p>
+          <a:p>
+            <a:pPr lvl="1"/>
+            <a:r>
+              <a:rPr lang="en-US" dirty="0" smtClean="0"/>
+              <a:t>The HOSTS field in </a:t>
+            </a:r>
+            <a:r>
+              <a:rPr lang="en-US" dirty="0" err="1" smtClean="0"/>
+              <a:t>DsoapInputFormat</a:t>
+            </a:r>
+            <a:r>
+              <a:rPr lang="en-US" dirty="0" smtClean="0"/>
+              <a:t>(2) must be updated with the hostnames of the </a:t>
+            </a:r>
+            <a:r>
+              <a:rPr lang="en-US" dirty="0" err="1" smtClean="0"/>
+              <a:t>datanodes</a:t>
+            </a:r>
+            <a:r>
+              <a:rPr lang="en-US" dirty="0" smtClean="0"/>
+              <a:t> </a:t>
+            </a:r>
+            <a:r>
+              <a:rPr lang="en-US" smtClean="0"/>
+              <a:t>before it </a:t>
+            </a:r>
+            <a:r>
+              <a:rPr lang="en-US" dirty="0" smtClean="0"/>
+              <a:t>can be used</a:t>
+            </a:r>
+            <a:endParaRPr lang="en-US" dirty="0" smtClean="0"/>
           </a:p>
           <a:p>
             <a:r>

</xml_diff>